<commit_message>
wavelets transform math function for metabolism data
</commit_message>
<xml_diff>
--- a/src/GCModeller/engine/docs/workflow.pptx
+++ b/src/GCModeller/engine/docs/workflow.pptx
@@ -107,6 +107,265 @@
 </p:presentation>
 </file>
 
+<file path=ppt/charts/chart1.xml><?xml version="1.0" encoding="utf-8"?>
+<c:chartSpace xmlns:c="http://schemas.openxmlformats.org/drawingml/2006/chart" xmlns:a="http://schemas.openxmlformats.org/drawingml/2006/main" xmlns:r="http://schemas.openxmlformats.org/officeDocument/2006/relationships">
+  <c:date1904 val="0"/>
+  <c:lang val="zh-CN"/>
+  <c:roundedCorners val="0"/>
+  <mc:AlternateContent xmlns:mc="http://schemas.openxmlformats.org/markup-compatibility/2006">
+    <mc:Choice xmlns:c14="http://schemas.microsoft.com/office/drawing/2007/8/2/chart" Requires="c14">
+      <c14:style val="118"/>
+    </mc:Choice>
+    <mc:Fallback>
+      <c:style val="18"/>
+    </mc:Fallback>
+  </mc:AlternateContent>
+  <c:chart>
+    <c:autoTitleDeleted val="1"/>
+    <c:plotArea>
+      <c:layout/>
+      <c:lineChart>
+        <c:grouping val="standard"/>
+        <c:varyColors val="0"/>
+        <c:ser>
+          <c:idx val="0"/>
+          <c:order val="0"/>
+          <c:tx>
+            <c:strRef>
+              <c:f>Sheet1!$B$1</c:f>
+              <c:strCache>
+                <c:ptCount val="1"/>
+                <c:pt idx="0">
+                  <c:v>系列 1</c:v>
+                </c:pt>
+              </c:strCache>
+            </c:strRef>
+          </c:tx>
+          <c:cat>
+            <c:strRef>
+              <c:f>Sheet1!$A$2:$A$5</c:f>
+              <c:strCache>
+                <c:ptCount val="4"/>
+                <c:pt idx="0">
+                  <c:v>类别 1</c:v>
+                </c:pt>
+                <c:pt idx="1">
+                  <c:v>类别 2</c:v>
+                </c:pt>
+                <c:pt idx="2">
+                  <c:v>类别 3</c:v>
+                </c:pt>
+                <c:pt idx="3">
+                  <c:v>类别 4</c:v>
+                </c:pt>
+              </c:strCache>
+            </c:strRef>
+          </c:cat>
+          <c:val>
+            <c:numRef>
+              <c:f>Sheet1!$B$2:$B$5</c:f>
+              <c:numCache>
+                <c:formatCode>General</c:formatCode>
+                <c:ptCount val="4"/>
+                <c:pt idx="0">
+                  <c:v>4.3</c:v>
+                </c:pt>
+                <c:pt idx="1">
+                  <c:v>2.5</c:v>
+                </c:pt>
+                <c:pt idx="2">
+                  <c:v>3.5</c:v>
+                </c:pt>
+                <c:pt idx="3">
+                  <c:v>4.5</c:v>
+                </c:pt>
+              </c:numCache>
+            </c:numRef>
+          </c:val>
+          <c:smooth val="0"/>
+        </c:ser>
+        <c:ser>
+          <c:idx val="1"/>
+          <c:order val="1"/>
+          <c:tx>
+            <c:strRef>
+              <c:f>Sheet1!$C$1</c:f>
+              <c:strCache>
+                <c:ptCount val="1"/>
+                <c:pt idx="0">
+                  <c:v>系列 2</c:v>
+                </c:pt>
+              </c:strCache>
+            </c:strRef>
+          </c:tx>
+          <c:cat>
+            <c:strRef>
+              <c:f>Sheet1!$A$2:$A$5</c:f>
+              <c:strCache>
+                <c:ptCount val="4"/>
+                <c:pt idx="0">
+                  <c:v>类别 1</c:v>
+                </c:pt>
+                <c:pt idx="1">
+                  <c:v>类别 2</c:v>
+                </c:pt>
+                <c:pt idx="2">
+                  <c:v>类别 3</c:v>
+                </c:pt>
+                <c:pt idx="3">
+                  <c:v>类别 4</c:v>
+                </c:pt>
+              </c:strCache>
+            </c:strRef>
+          </c:cat>
+          <c:val>
+            <c:numRef>
+              <c:f>Sheet1!$C$2:$C$5</c:f>
+              <c:numCache>
+                <c:formatCode>General</c:formatCode>
+                <c:ptCount val="4"/>
+                <c:pt idx="0">
+                  <c:v>2.4</c:v>
+                </c:pt>
+                <c:pt idx="1">
+                  <c:v>4.4000000000000004</c:v>
+                </c:pt>
+                <c:pt idx="2">
+                  <c:v>1.8</c:v>
+                </c:pt>
+                <c:pt idx="3">
+                  <c:v>2.8</c:v>
+                </c:pt>
+              </c:numCache>
+            </c:numRef>
+          </c:val>
+          <c:smooth val="0"/>
+        </c:ser>
+        <c:ser>
+          <c:idx val="2"/>
+          <c:order val="2"/>
+          <c:tx>
+            <c:strRef>
+              <c:f>Sheet1!$D$1</c:f>
+              <c:strCache>
+                <c:ptCount val="1"/>
+                <c:pt idx="0">
+                  <c:v>系列 3</c:v>
+                </c:pt>
+              </c:strCache>
+            </c:strRef>
+          </c:tx>
+          <c:cat>
+            <c:strRef>
+              <c:f>Sheet1!$A$2:$A$5</c:f>
+              <c:strCache>
+                <c:ptCount val="4"/>
+                <c:pt idx="0">
+                  <c:v>类别 1</c:v>
+                </c:pt>
+                <c:pt idx="1">
+                  <c:v>类别 2</c:v>
+                </c:pt>
+                <c:pt idx="2">
+                  <c:v>类别 3</c:v>
+                </c:pt>
+                <c:pt idx="3">
+                  <c:v>类别 4</c:v>
+                </c:pt>
+              </c:strCache>
+            </c:strRef>
+          </c:cat>
+          <c:val>
+            <c:numRef>
+              <c:f>Sheet1!$D$2:$D$5</c:f>
+              <c:numCache>
+                <c:formatCode>General</c:formatCode>
+                <c:ptCount val="4"/>
+                <c:pt idx="0">
+                  <c:v>2</c:v>
+                </c:pt>
+                <c:pt idx="1">
+                  <c:v>2</c:v>
+                </c:pt>
+                <c:pt idx="2">
+                  <c:v>3</c:v>
+                </c:pt>
+                <c:pt idx="3">
+                  <c:v>5</c:v>
+                </c:pt>
+              </c:numCache>
+            </c:numRef>
+          </c:val>
+          <c:smooth val="0"/>
+        </c:ser>
+        <c:dLbls>
+          <c:dLblPos val="ctr"/>
+          <c:showLegendKey val="0"/>
+          <c:showVal val="0"/>
+          <c:showCatName val="0"/>
+          <c:showSerName val="0"/>
+          <c:showPercent val="0"/>
+          <c:showBubbleSize val="0"/>
+        </c:dLbls>
+        <c:marker val="1"/>
+        <c:smooth val="0"/>
+        <c:axId val="86259200"/>
+        <c:axId val="86260736"/>
+      </c:lineChart>
+      <c:catAx>
+        <c:axId val="86259200"/>
+        <c:scaling>
+          <c:orientation val="minMax"/>
+        </c:scaling>
+        <c:delete val="1"/>
+        <c:axPos val="b"/>
+        <c:majorTickMark val="out"/>
+        <c:minorTickMark val="none"/>
+        <c:tickLblPos val="nextTo"/>
+        <c:crossAx val="86260736"/>
+        <c:crosses val="autoZero"/>
+        <c:auto val="1"/>
+        <c:lblAlgn val="ctr"/>
+        <c:lblOffset val="100"/>
+        <c:noMultiLvlLbl val="0"/>
+      </c:catAx>
+      <c:valAx>
+        <c:axId val="86260736"/>
+        <c:scaling>
+          <c:orientation val="minMax"/>
+        </c:scaling>
+        <c:delete val="0"/>
+        <c:axPos val="l"/>
+        <c:majorGridlines/>
+        <c:numFmt formatCode="General" sourceLinked="1"/>
+        <c:majorTickMark val="out"/>
+        <c:minorTickMark val="none"/>
+        <c:tickLblPos val="nextTo"/>
+        <c:crossAx val="86259200"/>
+        <c:crosses val="autoZero"/>
+        <c:crossBetween val="between"/>
+      </c:valAx>
+    </c:plotArea>
+    <c:plotVisOnly val="1"/>
+    <c:dispBlanksAs val="gap"/>
+    <c:showDLblsOverMax val="0"/>
+  </c:chart>
+  <c:txPr>
+    <a:bodyPr/>
+    <a:lstStyle/>
+    <a:p>
+      <a:pPr>
+        <a:defRPr sz="1800"/>
+      </a:pPr>
+      <a:endParaRPr lang="zh-CN"/>
+    </a:p>
+  </c:txPr>
+  <c:externalData r:id="rId1">
+    <c:autoUpdate val="0"/>
+  </c:externalData>
+</c:chartSpace>
+</file>
+
 <file path=ppt/diagrams/colors1.xml><?xml version="1.0" encoding="utf-8"?>
 <dgm:colorsDef xmlns:dgm="http://schemas.openxmlformats.org/drawingml/2006/diagram" xmlns:a="http://schemas.openxmlformats.org/drawingml/2006/main" uniqueId="urn:microsoft.com/office/officeart/2005/8/colors/accent1_2">
   <dgm:title val=""/>
@@ -905,7 +1164,7 @@
         <a:bodyPr/>
         <a:lstStyle/>
         <a:p>
-          <a:endParaRPr lang="zh-CN" altLang="en-US"/>
+          <a:endParaRPr lang="zh-CN" altLang="en-US" dirty="0"/>
         </a:p>
       </dgm:t>
     </dgm:pt>
@@ -982,14 +1241,35 @@
         </dgm:presLayoutVars>
       </dgm:prSet>
       <dgm:spPr/>
+      <dgm:t>
+        <a:bodyPr/>
+        <a:lstStyle/>
+        <a:p>
+          <a:endParaRPr lang="zh-CN" altLang="en-US"/>
+        </a:p>
+      </dgm:t>
     </dgm:pt>
     <dgm:pt modelId="{39DDABE7-A49C-46BC-B73C-E5FF411B9731}" type="pres">
       <dgm:prSet presAssocID="{D7B649F2-8378-47E6-A9D8-DD31959033C9}" presName="gear1srcNode" presStyleLbl="node1" presStyleIdx="0" presStyleCnt="3"/>
       <dgm:spPr/>
+      <dgm:t>
+        <a:bodyPr/>
+        <a:lstStyle/>
+        <a:p>
+          <a:endParaRPr lang="zh-CN" altLang="en-US"/>
+        </a:p>
+      </dgm:t>
     </dgm:pt>
     <dgm:pt modelId="{8A4F96FE-E6D4-47D5-B9FF-A27CC787A6B1}" type="pres">
       <dgm:prSet presAssocID="{D7B649F2-8378-47E6-A9D8-DD31959033C9}" presName="gear1dstNode" presStyleLbl="node1" presStyleIdx="0" presStyleCnt="3"/>
       <dgm:spPr/>
+      <dgm:t>
+        <a:bodyPr/>
+        <a:lstStyle/>
+        <a:p>
+          <a:endParaRPr lang="zh-CN" altLang="en-US"/>
+        </a:p>
+      </dgm:t>
     </dgm:pt>
     <dgm:pt modelId="{01E522F8-1614-4371-8917-C2FA08E70C51}" type="pres">
       <dgm:prSet presAssocID="{6FCAD859-3C04-4F6C-BDA1-0E59AE7CAC44}" presName="gear2" presStyleLbl="node1" presStyleIdx="1" presStyleCnt="3">
@@ -999,18 +1279,46 @@
         </dgm:presLayoutVars>
       </dgm:prSet>
       <dgm:spPr/>
+      <dgm:t>
+        <a:bodyPr/>
+        <a:lstStyle/>
+        <a:p>
+          <a:endParaRPr lang="zh-CN" altLang="en-US"/>
+        </a:p>
+      </dgm:t>
     </dgm:pt>
     <dgm:pt modelId="{9D74E6FB-BB0D-457F-AE0C-A87627BF0B20}" type="pres">
       <dgm:prSet presAssocID="{6FCAD859-3C04-4F6C-BDA1-0E59AE7CAC44}" presName="gear2srcNode" presStyleLbl="node1" presStyleIdx="1" presStyleCnt="3"/>
       <dgm:spPr/>
+      <dgm:t>
+        <a:bodyPr/>
+        <a:lstStyle/>
+        <a:p>
+          <a:endParaRPr lang="zh-CN" altLang="en-US"/>
+        </a:p>
+      </dgm:t>
     </dgm:pt>
     <dgm:pt modelId="{26F00889-AF9B-4BE4-AE99-5C3B06CD92A2}" type="pres">
       <dgm:prSet presAssocID="{6FCAD859-3C04-4F6C-BDA1-0E59AE7CAC44}" presName="gear2dstNode" presStyleLbl="node1" presStyleIdx="1" presStyleCnt="3"/>
       <dgm:spPr/>
+      <dgm:t>
+        <a:bodyPr/>
+        <a:lstStyle/>
+        <a:p>
+          <a:endParaRPr lang="zh-CN" altLang="en-US"/>
+        </a:p>
+      </dgm:t>
     </dgm:pt>
     <dgm:pt modelId="{9B67B6B7-4433-4529-83E3-ADDC080DEEED}" type="pres">
       <dgm:prSet presAssocID="{3D52C528-695A-401E-8D40-17DCF899F0EF}" presName="gear3" presStyleLbl="node1" presStyleIdx="2" presStyleCnt="3"/>
       <dgm:spPr/>
+      <dgm:t>
+        <a:bodyPr/>
+        <a:lstStyle/>
+        <a:p>
+          <a:endParaRPr lang="zh-CN" altLang="en-US"/>
+        </a:p>
+      </dgm:t>
     </dgm:pt>
     <dgm:pt modelId="{6A20D547-D17F-4981-BA45-73D9C8D10026}" type="pres">
       <dgm:prSet presAssocID="{3D52C528-695A-401E-8D40-17DCF899F0EF}" presName="gear3tx" presStyleLbl="node1" presStyleIdx="2" presStyleCnt="3">
@@ -1020,26 +1328,68 @@
         </dgm:presLayoutVars>
       </dgm:prSet>
       <dgm:spPr/>
+      <dgm:t>
+        <a:bodyPr/>
+        <a:lstStyle/>
+        <a:p>
+          <a:endParaRPr lang="zh-CN" altLang="en-US"/>
+        </a:p>
+      </dgm:t>
     </dgm:pt>
     <dgm:pt modelId="{9709038A-2239-4E55-B725-833B5006024B}" type="pres">
       <dgm:prSet presAssocID="{3D52C528-695A-401E-8D40-17DCF899F0EF}" presName="gear3srcNode" presStyleLbl="node1" presStyleIdx="2" presStyleCnt="3"/>
       <dgm:spPr/>
+      <dgm:t>
+        <a:bodyPr/>
+        <a:lstStyle/>
+        <a:p>
+          <a:endParaRPr lang="zh-CN" altLang="en-US"/>
+        </a:p>
+      </dgm:t>
     </dgm:pt>
     <dgm:pt modelId="{F41B61EA-5B78-4A2A-8E14-B303204461EB}" type="pres">
       <dgm:prSet presAssocID="{3D52C528-695A-401E-8D40-17DCF899F0EF}" presName="gear3dstNode" presStyleLbl="node1" presStyleIdx="2" presStyleCnt="3"/>
       <dgm:spPr/>
+      <dgm:t>
+        <a:bodyPr/>
+        <a:lstStyle/>
+        <a:p>
+          <a:endParaRPr lang="zh-CN" altLang="en-US"/>
+        </a:p>
+      </dgm:t>
     </dgm:pt>
     <dgm:pt modelId="{A62D8777-3F36-4BA1-9BC5-8B8F940762D8}" type="pres">
       <dgm:prSet presAssocID="{6430739F-F6A0-4039-8437-A3BC162D970A}" presName="connector1" presStyleLbl="sibTrans2D1" presStyleIdx="0" presStyleCnt="3"/>
       <dgm:spPr/>
+      <dgm:t>
+        <a:bodyPr/>
+        <a:lstStyle/>
+        <a:p>
+          <a:endParaRPr lang="zh-CN" altLang="en-US"/>
+        </a:p>
+      </dgm:t>
     </dgm:pt>
     <dgm:pt modelId="{07C991A4-407F-4A17-A1DB-D8427B1BAC27}" type="pres">
       <dgm:prSet presAssocID="{C2ED0C1F-E7F8-4EAB-9609-2BF403F8E4DA}" presName="connector2" presStyleLbl="sibTrans2D1" presStyleIdx="1" presStyleCnt="3"/>
       <dgm:spPr/>
+      <dgm:t>
+        <a:bodyPr/>
+        <a:lstStyle/>
+        <a:p>
+          <a:endParaRPr lang="zh-CN" altLang="en-US"/>
+        </a:p>
+      </dgm:t>
     </dgm:pt>
     <dgm:pt modelId="{3DC58179-06A7-4978-91BF-9F43B0A94AA5}" type="pres">
       <dgm:prSet presAssocID="{8A13E864-A3B8-40E8-B530-F80D33619F05}" presName="connector3" presStyleLbl="sibTrans2D1" presStyleIdx="2" presStyleCnt="3"/>
       <dgm:spPr/>
+      <dgm:t>
+        <a:bodyPr/>
+        <a:lstStyle/>
+        <a:p>
+          <a:endParaRPr lang="zh-CN" altLang="en-US"/>
+        </a:p>
+      </dgm:t>
     </dgm:pt>
   </dgm:ptLst>
   <dgm:cxnLst>
@@ -1049,8 +1399,8 @@
     <dgm:cxn modelId="{4991DC46-6A1F-4B5B-848F-501959557810}" type="presOf" srcId="{D7B649F2-8378-47E6-A9D8-DD31959033C9}" destId="{8A4F96FE-E6D4-47D5-B9FF-A27CC787A6B1}" srcOrd="2" destOrd="0" presId="urn:microsoft.com/office/officeart/2005/8/layout/gear1"/>
     <dgm:cxn modelId="{ED1CB6E3-6F83-4D91-A4CC-EA1E4EFF0006}" type="presOf" srcId="{3D52C528-695A-401E-8D40-17DCF899F0EF}" destId="{9B67B6B7-4433-4529-83E3-ADDC080DEEED}" srcOrd="0" destOrd="0" presId="urn:microsoft.com/office/officeart/2005/8/layout/gear1"/>
     <dgm:cxn modelId="{79E9B777-D5DA-48A6-BC69-72B2C1D1F11D}" type="presOf" srcId="{3D52C528-695A-401E-8D40-17DCF899F0EF}" destId="{6A20D547-D17F-4981-BA45-73D9C8D10026}" srcOrd="1" destOrd="0" presId="urn:microsoft.com/office/officeart/2005/8/layout/gear1"/>
+    <dgm:cxn modelId="{A1E48F50-699C-4CB3-BCB9-F1727DDE7D56}" type="presOf" srcId="{2A13A74B-3207-41F2-A7F9-918920AF009A}" destId="{8B450953-7138-49FE-B7D7-7A75131F8BDB}" srcOrd="0" destOrd="0" presId="urn:microsoft.com/office/officeart/2005/8/layout/gear1"/>
     <dgm:cxn modelId="{318360A6-2715-4AF7-BBE3-3C71026746B1}" srcId="{2A13A74B-3207-41F2-A7F9-918920AF009A}" destId="{3D52C528-695A-401E-8D40-17DCF899F0EF}" srcOrd="2" destOrd="0" parTransId="{E61A879E-7F00-4D2F-9D49-AA4A273997EA}" sibTransId="{8A13E864-A3B8-40E8-B530-F80D33619F05}"/>
-    <dgm:cxn modelId="{A1E48F50-699C-4CB3-BCB9-F1727DDE7D56}" type="presOf" srcId="{2A13A74B-3207-41F2-A7F9-918920AF009A}" destId="{8B450953-7138-49FE-B7D7-7A75131F8BDB}" srcOrd="0" destOrd="0" presId="urn:microsoft.com/office/officeart/2005/8/layout/gear1"/>
     <dgm:cxn modelId="{34FD8A2D-918B-4D50-9276-E17D18BD49DD}" type="presOf" srcId="{6FCAD859-3C04-4F6C-BDA1-0E59AE7CAC44}" destId="{01E522F8-1614-4371-8917-C2FA08E70C51}" srcOrd="0" destOrd="0" presId="urn:microsoft.com/office/officeart/2005/8/layout/gear1"/>
     <dgm:cxn modelId="{01B3AB2B-65B4-4A9C-A3FA-861A7FA830B3}" type="presOf" srcId="{3D52C528-695A-401E-8D40-17DCF899F0EF}" destId="{9709038A-2239-4E55-B725-833B5006024B}" srcOrd="2" destOrd="0" presId="urn:microsoft.com/office/officeart/2005/8/layout/gear1"/>
     <dgm:cxn modelId="{D66239D1-D9B0-41B9-BBEB-69B8C386CA24}" type="presOf" srcId="{8A13E864-A3B8-40E8-B530-F80D33619F05}" destId="{3DC58179-06A7-4978-91BF-9F43B0A94AA5}" srcOrd="0" destOrd="0" presId="urn:microsoft.com/office/officeart/2005/8/layout/gear1"/>
@@ -1298,7 +1648,7 @@
               <a:spcPct val="35000"/>
             </a:spcAft>
           </a:pPr>
-          <a:endParaRPr lang="zh-CN" altLang="en-US" sz="2100" kern="1200"/>
+          <a:endParaRPr lang="zh-CN" altLang="en-US" sz="2100" kern="1200" dirty="0"/>
         </a:p>
       </dsp:txBody>
       <dsp:txXfrm>
@@ -3378,7 +3728,7 @@
           <a:p>
             <a:fld id="{530820CF-B880-4189-942D-D702A7CBA730}" type="datetimeFigureOut">
               <a:rPr lang="zh-CN" altLang="en-US" smtClean="0"/>
-              <a:t>2018/9/25</a:t>
+              <a:t>2018/9/27</a:t>
             </a:fld>
             <a:endParaRPr lang="zh-CN" altLang="en-US"/>
           </a:p>
@@ -3543,7 +3893,7 @@
           <a:p>
             <a:fld id="{530820CF-B880-4189-942D-D702A7CBA730}" type="datetimeFigureOut">
               <a:rPr lang="zh-CN" altLang="en-US" smtClean="0"/>
-              <a:t>2018/9/25</a:t>
+              <a:t>2018/9/27</a:t>
             </a:fld>
             <a:endParaRPr lang="zh-CN" altLang="en-US"/>
           </a:p>
@@ -3718,7 +4068,7 @@
           <a:p>
             <a:fld id="{530820CF-B880-4189-942D-D702A7CBA730}" type="datetimeFigureOut">
               <a:rPr lang="zh-CN" altLang="en-US" smtClean="0"/>
-              <a:t>2018/9/25</a:t>
+              <a:t>2018/9/27</a:t>
             </a:fld>
             <a:endParaRPr lang="zh-CN" altLang="en-US"/>
           </a:p>
@@ -3883,7 +4233,7 @@
           <a:p>
             <a:fld id="{530820CF-B880-4189-942D-D702A7CBA730}" type="datetimeFigureOut">
               <a:rPr lang="zh-CN" altLang="en-US" smtClean="0"/>
-              <a:t>2018/9/25</a:t>
+              <a:t>2018/9/27</a:t>
             </a:fld>
             <a:endParaRPr lang="zh-CN" altLang="en-US"/>
           </a:p>
@@ -4124,7 +4474,7 @@
           <a:p>
             <a:fld id="{530820CF-B880-4189-942D-D702A7CBA730}" type="datetimeFigureOut">
               <a:rPr lang="zh-CN" altLang="en-US" smtClean="0"/>
-              <a:t>2018/9/25</a:t>
+              <a:t>2018/9/27</a:t>
             </a:fld>
             <a:endParaRPr lang="zh-CN" altLang="en-US"/>
           </a:p>
@@ -4407,7 +4757,7 @@
           <a:p>
             <a:fld id="{530820CF-B880-4189-942D-D702A7CBA730}" type="datetimeFigureOut">
               <a:rPr lang="zh-CN" altLang="en-US" smtClean="0"/>
-              <a:t>2018/9/25</a:t>
+              <a:t>2018/9/27</a:t>
             </a:fld>
             <a:endParaRPr lang="zh-CN" altLang="en-US"/>
           </a:p>
@@ -4824,7 +5174,7 @@
           <a:p>
             <a:fld id="{530820CF-B880-4189-942D-D702A7CBA730}" type="datetimeFigureOut">
               <a:rPr lang="zh-CN" altLang="en-US" smtClean="0"/>
-              <a:t>2018/9/25</a:t>
+              <a:t>2018/9/27</a:t>
             </a:fld>
             <a:endParaRPr lang="zh-CN" altLang="en-US"/>
           </a:p>
@@ -4937,7 +5287,7 @@
           <a:p>
             <a:fld id="{530820CF-B880-4189-942D-D702A7CBA730}" type="datetimeFigureOut">
               <a:rPr lang="zh-CN" altLang="en-US" smtClean="0"/>
-              <a:t>2018/9/25</a:t>
+              <a:t>2018/9/27</a:t>
             </a:fld>
             <a:endParaRPr lang="zh-CN" altLang="en-US"/>
           </a:p>
@@ -5027,7 +5377,7 @@
           <a:p>
             <a:fld id="{530820CF-B880-4189-942D-D702A7CBA730}" type="datetimeFigureOut">
               <a:rPr lang="zh-CN" altLang="en-US" smtClean="0"/>
-              <a:t>2018/9/25</a:t>
+              <a:t>2018/9/27</a:t>
             </a:fld>
             <a:endParaRPr lang="zh-CN" altLang="en-US"/>
           </a:p>
@@ -5299,7 +5649,7 @@
           <a:p>
             <a:fld id="{530820CF-B880-4189-942D-D702A7CBA730}" type="datetimeFigureOut">
               <a:rPr lang="zh-CN" altLang="en-US" smtClean="0"/>
-              <a:t>2018/9/25</a:t>
+              <a:t>2018/9/27</a:t>
             </a:fld>
             <a:endParaRPr lang="zh-CN" altLang="en-US"/>
           </a:p>
@@ -5547,7 +5897,7 @@
           <a:p>
             <a:fld id="{530820CF-B880-4189-942D-D702A7CBA730}" type="datetimeFigureOut">
               <a:rPr lang="zh-CN" altLang="en-US" smtClean="0"/>
-              <a:t>2018/9/25</a:t>
+              <a:t>2018/9/27</a:t>
             </a:fld>
             <a:endParaRPr lang="zh-CN" altLang="en-US"/>
           </a:p>
@@ -5755,7 +6105,7 @@
           <a:p>
             <a:fld id="{530820CF-B880-4189-942D-D702A7CBA730}" type="datetimeFigureOut">
               <a:rPr lang="zh-CN" altLang="en-US" smtClean="0"/>
-              <a:t>2018/9/25</a:t>
+              <a:t>2018/9/27</a:t>
             </a:fld>
             <a:endParaRPr lang="zh-CN" altLang="en-US"/>
           </a:p>
@@ -6125,378 +6475,555 @@
           <a:chExt cx="0" cy="0"/>
         </a:xfrm>
       </p:grpSpPr>
-      <p:sp>
-        <p:nvSpPr>
-          <p:cNvPr id="4" name="圆柱形 3"/>
-          <p:cNvSpPr/>
+      <p:grpSp>
+        <p:nvGrpSpPr>
+          <p:cNvPr id="17" name="组合 16"/>
+          <p:cNvGrpSpPr/>
           <p:nvPr/>
-        </p:nvSpPr>
-        <p:spPr>
+        </p:nvGrpSpPr>
+        <p:grpSpPr>
           <a:xfrm>
-            <a:off x="323528" y="463104"/>
-            <a:ext cx="1224136" cy="1584176"/>
+            <a:off x="290109" y="188640"/>
+            <a:ext cx="9343798" cy="6575660"/>
+            <a:chOff x="290109" y="188640"/>
+            <a:chExt cx="9343798" cy="6575660"/>
           </a:xfrm>
-          <a:prstGeom prst="can">
-            <a:avLst/>
-          </a:prstGeom>
-        </p:spPr>
-        <p:style>
-          <a:lnRef idx="1">
-            <a:schemeClr val="accent3"/>
-          </a:lnRef>
-          <a:fillRef idx="3">
-            <a:schemeClr val="accent3"/>
-          </a:fillRef>
-          <a:effectRef idx="2">
-            <a:schemeClr val="accent3"/>
-          </a:effectRef>
-          <a:fontRef idx="minor">
-            <a:schemeClr val="lt1"/>
-          </a:fontRef>
-        </p:style>
-        <p:txBody>
-          <a:bodyPr rtlCol="0" anchor="ctr"/>
-          <a:lstStyle/>
-          <a:p>
-            <a:pPr algn="ctr"/>
-            <a:r>
-              <a:rPr lang="en-US" altLang="zh-CN" dirty="0" smtClean="0"/>
-              <a:t>SBML</a:t>
-            </a:r>
-            <a:endParaRPr lang="zh-CN" altLang="en-US" dirty="0"/>
-          </a:p>
-        </p:txBody>
-      </p:sp>
-      <p:sp>
-        <p:nvSpPr>
-          <p:cNvPr id="5" name="流程图: 多文档 4"/>
-          <p:cNvSpPr/>
-          <p:nvPr/>
-        </p:nvSpPr>
-        <p:spPr>
-          <a:xfrm>
-            <a:off x="3059832" y="1598272"/>
-            <a:ext cx="2160240" cy="1164913"/>
-          </a:xfrm>
-          <a:prstGeom prst="flowChartMultidocument">
-            <a:avLst/>
-          </a:prstGeom>
-        </p:spPr>
-        <p:style>
-          <a:lnRef idx="1">
-            <a:schemeClr val="accent4"/>
-          </a:lnRef>
-          <a:fillRef idx="3">
-            <a:schemeClr val="accent4"/>
-          </a:fillRef>
-          <a:effectRef idx="2">
-            <a:schemeClr val="accent4"/>
-          </a:effectRef>
-          <a:fontRef idx="minor">
-            <a:schemeClr val="lt1"/>
-          </a:fontRef>
-        </p:style>
-        <p:txBody>
-          <a:bodyPr rtlCol="0" anchor="ctr"/>
-          <a:lstStyle/>
-          <a:p>
-            <a:pPr algn="ctr"/>
-            <a:r>
-              <a:rPr lang="en-US" altLang="zh-CN" sz="1600" dirty="0"/>
-              <a:t>GCMarkupLanguage</a:t>
-            </a:r>
-            <a:endParaRPr lang="zh-CN" altLang="en-US" sz="1600" dirty="0"/>
-          </a:p>
-        </p:txBody>
-      </p:sp>
-      <p:sp>
-        <p:nvSpPr>
-          <p:cNvPr id="6" name="流程图: 多文档 5"/>
-          <p:cNvSpPr/>
-          <p:nvPr/>
-        </p:nvSpPr>
-        <p:spPr>
-          <a:xfrm>
-            <a:off x="3059832" y="290919"/>
-            <a:ext cx="2160240" cy="1079051"/>
-          </a:xfrm>
-          <a:prstGeom prst="flowChartMultidocument">
-            <a:avLst/>
-          </a:prstGeom>
-        </p:spPr>
-        <p:style>
-          <a:lnRef idx="1">
-            <a:schemeClr val="accent4"/>
-          </a:lnRef>
-          <a:fillRef idx="3">
-            <a:schemeClr val="accent4"/>
-          </a:fillRef>
-          <a:effectRef idx="2">
-            <a:schemeClr val="accent4"/>
-          </a:effectRef>
-          <a:fontRef idx="minor">
-            <a:schemeClr val="lt1"/>
-          </a:fontRef>
-        </p:style>
-        <p:txBody>
-          <a:bodyPr rtlCol="0" anchor="ctr"/>
-          <a:lstStyle/>
-          <a:p>
-            <a:pPr algn="ctr"/>
-            <a:r>
-              <a:rPr lang="en-US" altLang="zh-CN" sz="1600" dirty="0"/>
-              <a:t>GCTabular</a:t>
-            </a:r>
-            <a:endParaRPr lang="zh-CN" altLang="en-US" sz="1600" dirty="0"/>
-          </a:p>
-        </p:txBody>
-      </p:sp>
-      <p:sp>
-        <p:nvSpPr>
-          <p:cNvPr id="7" name="右箭头 6"/>
-          <p:cNvSpPr/>
-          <p:nvPr/>
-        </p:nvSpPr>
-        <p:spPr>
-          <a:xfrm rot="20615388">
-            <a:off x="1723999" y="728270"/>
-            <a:ext cx="1225751" cy="560394"/>
-          </a:xfrm>
-          <a:prstGeom prst="rightArrow">
-            <a:avLst/>
-          </a:prstGeom>
-        </p:spPr>
-        <p:style>
-          <a:lnRef idx="1">
-            <a:schemeClr val="accent1"/>
-          </a:lnRef>
-          <a:fillRef idx="3">
-            <a:schemeClr val="accent1"/>
-          </a:fillRef>
-          <a:effectRef idx="2">
-            <a:schemeClr val="accent1"/>
-          </a:effectRef>
-          <a:fontRef idx="minor">
-            <a:schemeClr val="lt1"/>
-          </a:fontRef>
-        </p:style>
-        <p:txBody>
-          <a:bodyPr rtlCol="0" anchor="ctr"/>
-          <a:lstStyle/>
-          <a:p>
-            <a:pPr algn="ctr"/>
-            <a:endParaRPr lang="zh-CN" altLang="en-US"/>
-          </a:p>
-        </p:txBody>
-      </p:sp>
-      <p:sp>
-        <p:nvSpPr>
-          <p:cNvPr id="8" name="右箭头 7"/>
-          <p:cNvSpPr/>
-          <p:nvPr/>
-        </p:nvSpPr>
-        <p:spPr>
-          <a:xfrm rot="2730367">
-            <a:off x="1668254" y="1730370"/>
-            <a:ext cx="1433711" cy="560394"/>
-          </a:xfrm>
-          <a:prstGeom prst="rightArrow">
-            <a:avLst/>
-          </a:prstGeom>
-        </p:spPr>
-        <p:style>
-          <a:lnRef idx="1">
-            <a:schemeClr val="accent1"/>
-          </a:lnRef>
-          <a:fillRef idx="3">
-            <a:schemeClr val="accent1"/>
-          </a:fillRef>
-          <a:effectRef idx="2">
-            <a:schemeClr val="accent1"/>
-          </a:effectRef>
-          <a:fontRef idx="minor">
-            <a:schemeClr val="lt1"/>
-          </a:fontRef>
-        </p:style>
-        <p:txBody>
-          <a:bodyPr rtlCol="0" anchor="ctr"/>
-          <a:lstStyle/>
-          <a:p>
-            <a:pPr algn="ctr"/>
-            <a:endParaRPr lang="zh-CN" altLang="en-US"/>
-          </a:p>
-        </p:txBody>
-      </p:sp>
-      <p:sp>
-        <p:nvSpPr>
-          <p:cNvPr id="9" name="TextBox 8"/>
-          <p:cNvSpPr txBox="1"/>
-          <p:nvPr/>
-        </p:nvSpPr>
-        <p:spPr>
-          <a:xfrm>
-            <a:off x="996184" y="2393853"/>
-            <a:ext cx="1308371" cy="369332"/>
-          </a:xfrm>
-          <a:prstGeom prst="rect">
-            <a:avLst/>
-          </a:prstGeom>
-          <a:noFill/>
-        </p:spPr>
-        <p:txBody>
-          <a:bodyPr wrap="none" rtlCol="0">
-            <a:spAutoFit/>
-          </a:bodyPr>
-          <a:lstStyle/>
-          <a:p>
-            <a:r>
-              <a:rPr lang="en-US" altLang="zh-CN" dirty="0" smtClean="0"/>
-              <a:t>Build model</a:t>
-            </a:r>
-            <a:endParaRPr lang="zh-CN" altLang="en-US" dirty="0"/>
-          </a:p>
-        </p:txBody>
-      </p:sp>
-      <p:sp>
-        <p:nvSpPr>
-          <p:cNvPr id="10" name="圆柱形 9"/>
-          <p:cNvSpPr/>
-          <p:nvPr/>
-        </p:nvSpPr>
-        <p:spPr>
-          <a:xfrm>
-            <a:off x="323528" y="3022260"/>
-            <a:ext cx="1224136" cy="1414852"/>
-          </a:xfrm>
-          <a:prstGeom prst="can">
-            <a:avLst/>
-          </a:prstGeom>
-        </p:spPr>
-        <p:style>
-          <a:lnRef idx="1">
-            <a:schemeClr val="accent5"/>
-          </a:lnRef>
-          <a:fillRef idx="3">
-            <a:schemeClr val="accent5"/>
-          </a:fillRef>
-          <a:effectRef idx="2">
-            <a:schemeClr val="accent5"/>
-          </a:effectRef>
-          <a:fontRef idx="minor">
-            <a:schemeClr val="lt1"/>
-          </a:fontRef>
-        </p:style>
-        <p:txBody>
-          <a:bodyPr rtlCol="0" anchor="ctr"/>
-          <a:lstStyle/>
-          <a:p>
-            <a:pPr algn="ctr"/>
-            <a:r>
-              <a:rPr lang="en-US" altLang="zh-CN" dirty="0" smtClean="0"/>
-              <a:t>RegPrecise</a:t>
-            </a:r>
-            <a:endParaRPr lang="zh-CN" altLang="en-US" dirty="0"/>
-          </a:p>
-        </p:txBody>
-      </p:sp>
-      <p:sp>
-        <p:nvSpPr>
-          <p:cNvPr id="11" name="加号 10"/>
-          <p:cNvSpPr/>
-          <p:nvPr/>
-        </p:nvSpPr>
-        <p:spPr>
-          <a:xfrm>
-            <a:off x="290109" y="2132856"/>
-            <a:ext cx="792088" cy="796975"/>
-          </a:xfrm>
-          <a:prstGeom prst="mathPlus">
-            <a:avLst/>
-          </a:prstGeom>
-        </p:spPr>
-        <p:style>
-          <a:lnRef idx="1">
-            <a:schemeClr val="accent5"/>
-          </a:lnRef>
-          <a:fillRef idx="3">
-            <a:schemeClr val="accent5"/>
-          </a:fillRef>
-          <a:effectRef idx="2">
-            <a:schemeClr val="accent5"/>
-          </a:effectRef>
-          <a:fontRef idx="minor">
-            <a:schemeClr val="lt1"/>
-          </a:fontRef>
-        </p:style>
-        <p:txBody>
-          <a:bodyPr rtlCol="0" anchor="ctr"/>
-          <a:lstStyle/>
-          <a:p>
-            <a:pPr algn="ctr"/>
-            <a:endParaRPr lang="zh-CN" altLang="en-US"/>
-          </a:p>
-        </p:txBody>
-      </p:sp>
-      <p:graphicFrame>
-        <p:nvGraphicFramePr>
-          <p:cNvPr id="12" name="图示 11"/>
-          <p:cNvGraphicFramePr/>
-          <p:nvPr>
-            <p:extLst>
-              <p:ext uri="{D42A27DB-BD31-4B8C-83A1-F6EECF244321}">
-                <p14:modId xmlns:p14="http://schemas.microsoft.com/office/powerpoint/2010/main" val="696000948"/>
-              </p:ext>
-            </p:extLst>
-          </p:nvPr>
-        </p:nvGraphicFramePr>
-        <p:xfrm>
-          <a:off x="4283968" y="188640"/>
-          <a:ext cx="5349939" cy="3379924"/>
-        </p:xfrm>
-        <a:graphic>
-          <a:graphicData uri="http://schemas.openxmlformats.org/drawingml/2006/diagram">
-            <dgm:relIds xmlns:dgm="http://schemas.openxmlformats.org/drawingml/2006/diagram" xmlns:r="http://schemas.openxmlformats.org/officeDocument/2006/relationships" r:dm="rId2" r:lo="rId3" r:qs="rId4" r:cs="rId5"/>
-          </a:graphicData>
-        </a:graphic>
-      </p:graphicFrame>
-      <p:sp>
-        <p:nvSpPr>
-          <p:cNvPr id="13" name="下箭头 12"/>
-          <p:cNvSpPr/>
-          <p:nvPr/>
-        </p:nvSpPr>
-        <p:spPr>
-          <a:xfrm>
-            <a:off x="7380312" y="3747363"/>
-            <a:ext cx="656980" cy="1121184"/>
-          </a:xfrm>
-          <a:prstGeom prst="downArrow">
-            <a:avLst/>
-          </a:prstGeom>
-        </p:spPr>
-        <p:style>
-          <a:lnRef idx="1">
-            <a:schemeClr val="accent1"/>
-          </a:lnRef>
-          <a:fillRef idx="3">
-            <a:schemeClr val="accent1"/>
-          </a:fillRef>
-          <a:effectRef idx="2">
-            <a:schemeClr val="accent1"/>
-          </a:effectRef>
-          <a:fontRef idx="minor">
-            <a:schemeClr val="lt1"/>
-          </a:fontRef>
-        </p:style>
-        <p:txBody>
-          <a:bodyPr rtlCol="0" anchor="ctr"/>
-          <a:lstStyle/>
-          <a:p>
-            <a:pPr algn="ctr"/>
-            <a:endParaRPr lang="zh-CN" altLang="en-US"/>
-          </a:p>
-        </p:txBody>
-      </p:sp>
+        </p:grpSpPr>
+        <p:sp>
+          <p:nvSpPr>
+            <p:cNvPr id="4" name="圆柱形 3"/>
+            <p:cNvSpPr/>
+            <p:nvPr/>
+          </p:nvSpPr>
+          <p:spPr>
+            <a:xfrm>
+              <a:off x="323528" y="463104"/>
+              <a:ext cx="1224136" cy="1584176"/>
+            </a:xfrm>
+            <a:prstGeom prst="can">
+              <a:avLst/>
+            </a:prstGeom>
+          </p:spPr>
+          <p:style>
+            <a:lnRef idx="1">
+              <a:schemeClr val="accent3"/>
+            </a:lnRef>
+            <a:fillRef idx="3">
+              <a:schemeClr val="accent3"/>
+            </a:fillRef>
+            <a:effectRef idx="2">
+              <a:schemeClr val="accent3"/>
+            </a:effectRef>
+            <a:fontRef idx="minor">
+              <a:schemeClr val="lt1"/>
+            </a:fontRef>
+          </p:style>
+          <p:txBody>
+            <a:bodyPr rtlCol="0" anchor="ctr"/>
+            <a:lstStyle/>
+            <a:p>
+              <a:pPr algn="ctr"/>
+              <a:r>
+                <a:rPr lang="en-US" altLang="zh-CN" dirty="0" smtClean="0"/>
+                <a:t>SBML</a:t>
+              </a:r>
+              <a:endParaRPr lang="zh-CN" altLang="en-US" dirty="0"/>
+            </a:p>
+          </p:txBody>
+        </p:sp>
+        <p:sp>
+          <p:nvSpPr>
+            <p:cNvPr id="5" name="流程图: 多文档 4"/>
+            <p:cNvSpPr/>
+            <p:nvPr/>
+          </p:nvSpPr>
+          <p:spPr>
+            <a:xfrm>
+              <a:off x="3059832" y="1598272"/>
+              <a:ext cx="2160240" cy="1164913"/>
+            </a:xfrm>
+            <a:prstGeom prst="flowChartMultidocument">
+              <a:avLst/>
+            </a:prstGeom>
+          </p:spPr>
+          <p:style>
+            <a:lnRef idx="1">
+              <a:schemeClr val="accent4"/>
+            </a:lnRef>
+            <a:fillRef idx="3">
+              <a:schemeClr val="accent4"/>
+            </a:fillRef>
+            <a:effectRef idx="2">
+              <a:schemeClr val="accent4"/>
+            </a:effectRef>
+            <a:fontRef idx="minor">
+              <a:schemeClr val="lt1"/>
+            </a:fontRef>
+          </p:style>
+          <p:txBody>
+            <a:bodyPr rtlCol="0" anchor="ctr"/>
+            <a:lstStyle/>
+            <a:p>
+              <a:pPr algn="ctr"/>
+              <a:r>
+                <a:rPr lang="en-US" altLang="zh-CN" sz="1600" dirty="0"/>
+                <a:t>GCMarkupLanguage</a:t>
+              </a:r>
+              <a:endParaRPr lang="zh-CN" altLang="en-US" sz="1600" dirty="0"/>
+            </a:p>
+          </p:txBody>
+        </p:sp>
+        <p:sp>
+          <p:nvSpPr>
+            <p:cNvPr id="6" name="流程图: 多文档 5"/>
+            <p:cNvSpPr/>
+            <p:nvPr/>
+          </p:nvSpPr>
+          <p:spPr>
+            <a:xfrm>
+              <a:off x="3059832" y="290919"/>
+              <a:ext cx="2160240" cy="1079051"/>
+            </a:xfrm>
+            <a:prstGeom prst="flowChartMultidocument">
+              <a:avLst/>
+            </a:prstGeom>
+          </p:spPr>
+          <p:style>
+            <a:lnRef idx="1">
+              <a:schemeClr val="accent4"/>
+            </a:lnRef>
+            <a:fillRef idx="3">
+              <a:schemeClr val="accent4"/>
+            </a:fillRef>
+            <a:effectRef idx="2">
+              <a:schemeClr val="accent4"/>
+            </a:effectRef>
+            <a:fontRef idx="minor">
+              <a:schemeClr val="lt1"/>
+            </a:fontRef>
+          </p:style>
+          <p:txBody>
+            <a:bodyPr rtlCol="0" anchor="ctr"/>
+            <a:lstStyle/>
+            <a:p>
+              <a:pPr algn="ctr"/>
+              <a:r>
+                <a:rPr lang="en-US" altLang="zh-CN" sz="1600" dirty="0"/>
+                <a:t>GCTabular</a:t>
+              </a:r>
+              <a:endParaRPr lang="zh-CN" altLang="en-US" sz="1600" dirty="0"/>
+            </a:p>
+          </p:txBody>
+        </p:sp>
+        <p:sp>
+          <p:nvSpPr>
+            <p:cNvPr id="7" name="右箭头 6"/>
+            <p:cNvSpPr/>
+            <p:nvPr/>
+          </p:nvSpPr>
+          <p:spPr>
+            <a:xfrm rot="20615388">
+              <a:off x="1723999" y="728270"/>
+              <a:ext cx="1225751" cy="560394"/>
+            </a:xfrm>
+            <a:prstGeom prst="rightArrow">
+              <a:avLst/>
+            </a:prstGeom>
+          </p:spPr>
+          <p:style>
+            <a:lnRef idx="1">
+              <a:schemeClr val="accent1"/>
+            </a:lnRef>
+            <a:fillRef idx="3">
+              <a:schemeClr val="accent1"/>
+            </a:fillRef>
+            <a:effectRef idx="2">
+              <a:schemeClr val="accent1"/>
+            </a:effectRef>
+            <a:fontRef idx="minor">
+              <a:schemeClr val="lt1"/>
+            </a:fontRef>
+          </p:style>
+          <p:txBody>
+            <a:bodyPr rtlCol="0" anchor="ctr"/>
+            <a:lstStyle/>
+            <a:p>
+              <a:pPr algn="ctr"/>
+              <a:endParaRPr lang="zh-CN" altLang="en-US"/>
+            </a:p>
+          </p:txBody>
+        </p:sp>
+        <p:sp>
+          <p:nvSpPr>
+            <p:cNvPr id="8" name="右箭头 7"/>
+            <p:cNvSpPr/>
+            <p:nvPr/>
+          </p:nvSpPr>
+          <p:spPr>
+            <a:xfrm rot="2730367">
+              <a:off x="1668254" y="1730370"/>
+              <a:ext cx="1433711" cy="560394"/>
+            </a:xfrm>
+            <a:prstGeom prst="rightArrow">
+              <a:avLst/>
+            </a:prstGeom>
+          </p:spPr>
+          <p:style>
+            <a:lnRef idx="1">
+              <a:schemeClr val="accent1"/>
+            </a:lnRef>
+            <a:fillRef idx="3">
+              <a:schemeClr val="accent1"/>
+            </a:fillRef>
+            <a:effectRef idx="2">
+              <a:schemeClr val="accent1"/>
+            </a:effectRef>
+            <a:fontRef idx="minor">
+              <a:schemeClr val="lt1"/>
+            </a:fontRef>
+          </p:style>
+          <p:txBody>
+            <a:bodyPr rtlCol="0" anchor="ctr"/>
+            <a:lstStyle/>
+            <a:p>
+              <a:pPr algn="ctr"/>
+              <a:endParaRPr lang="zh-CN" altLang="en-US"/>
+            </a:p>
+          </p:txBody>
+        </p:sp>
+        <p:sp>
+          <p:nvSpPr>
+            <p:cNvPr id="9" name="TextBox 8"/>
+            <p:cNvSpPr txBox="1"/>
+            <p:nvPr/>
+          </p:nvSpPr>
+          <p:spPr>
+            <a:xfrm>
+              <a:off x="996184" y="2393853"/>
+              <a:ext cx="1308371" cy="369332"/>
+            </a:xfrm>
+            <a:prstGeom prst="rect">
+              <a:avLst/>
+            </a:prstGeom>
+            <a:noFill/>
+          </p:spPr>
+          <p:txBody>
+            <a:bodyPr wrap="none" rtlCol="0">
+              <a:spAutoFit/>
+            </a:bodyPr>
+            <a:lstStyle/>
+            <a:p>
+              <a:r>
+                <a:rPr lang="en-US" altLang="zh-CN" dirty="0" smtClean="0"/>
+                <a:t>Build model</a:t>
+              </a:r>
+              <a:endParaRPr lang="zh-CN" altLang="en-US" dirty="0"/>
+            </a:p>
+          </p:txBody>
+        </p:sp>
+        <p:sp>
+          <p:nvSpPr>
+            <p:cNvPr id="10" name="圆柱形 9"/>
+            <p:cNvSpPr/>
+            <p:nvPr/>
+          </p:nvSpPr>
+          <p:spPr>
+            <a:xfrm>
+              <a:off x="323528" y="3022260"/>
+              <a:ext cx="1224136" cy="1414852"/>
+            </a:xfrm>
+            <a:prstGeom prst="can">
+              <a:avLst/>
+            </a:prstGeom>
+          </p:spPr>
+          <p:style>
+            <a:lnRef idx="1">
+              <a:schemeClr val="accent5"/>
+            </a:lnRef>
+            <a:fillRef idx="3">
+              <a:schemeClr val="accent5"/>
+            </a:fillRef>
+            <a:effectRef idx="2">
+              <a:schemeClr val="accent5"/>
+            </a:effectRef>
+            <a:fontRef idx="minor">
+              <a:schemeClr val="lt1"/>
+            </a:fontRef>
+          </p:style>
+          <p:txBody>
+            <a:bodyPr rtlCol="0" anchor="ctr"/>
+            <a:lstStyle/>
+            <a:p>
+              <a:pPr algn="ctr"/>
+              <a:r>
+                <a:rPr lang="en-US" altLang="zh-CN" dirty="0" smtClean="0"/>
+                <a:t>RegPrecise</a:t>
+              </a:r>
+              <a:endParaRPr lang="zh-CN" altLang="en-US" dirty="0"/>
+            </a:p>
+          </p:txBody>
+        </p:sp>
+        <p:sp>
+          <p:nvSpPr>
+            <p:cNvPr id="11" name="加号 10"/>
+            <p:cNvSpPr/>
+            <p:nvPr/>
+          </p:nvSpPr>
+          <p:spPr>
+            <a:xfrm>
+              <a:off x="290109" y="2132856"/>
+              <a:ext cx="792088" cy="796975"/>
+            </a:xfrm>
+            <a:prstGeom prst="mathPlus">
+              <a:avLst/>
+            </a:prstGeom>
+          </p:spPr>
+          <p:style>
+            <a:lnRef idx="1">
+              <a:schemeClr val="accent5"/>
+            </a:lnRef>
+            <a:fillRef idx="3">
+              <a:schemeClr val="accent5"/>
+            </a:fillRef>
+            <a:effectRef idx="2">
+              <a:schemeClr val="accent5"/>
+            </a:effectRef>
+            <a:fontRef idx="minor">
+              <a:schemeClr val="lt1"/>
+            </a:fontRef>
+          </p:style>
+          <p:txBody>
+            <a:bodyPr rtlCol="0" anchor="ctr"/>
+            <a:lstStyle/>
+            <a:p>
+              <a:pPr algn="ctr"/>
+              <a:endParaRPr lang="zh-CN" altLang="en-US"/>
+            </a:p>
+          </p:txBody>
+        </p:sp>
+        <p:graphicFrame>
+          <p:nvGraphicFramePr>
+            <p:cNvPr id="12" name="图示 11"/>
+            <p:cNvGraphicFramePr/>
+            <p:nvPr>
+              <p:extLst>
+                <p:ext uri="{D42A27DB-BD31-4B8C-83A1-F6EECF244321}">
+                  <p14:modId xmlns:p14="http://schemas.microsoft.com/office/powerpoint/2010/main" val="467582366"/>
+                </p:ext>
+              </p:extLst>
+            </p:nvPr>
+          </p:nvGraphicFramePr>
+          <p:xfrm>
+            <a:off x="4283968" y="188640"/>
+            <a:ext cx="5349939" cy="3379924"/>
+          </p:xfrm>
+          <a:graphic>
+            <a:graphicData uri="http://schemas.openxmlformats.org/drawingml/2006/diagram">
+              <dgm:relIds xmlns:dgm="http://schemas.openxmlformats.org/drawingml/2006/diagram" xmlns:r="http://schemas.openxmlformats.org/officeDocument/2006/relationships" r:dm="rId2" r:lo="rId3" r:qs="rId4" r:cs="rId5"/>
+            </a:graphicData>
+          </a:graphic>
+        </p:graphicFrame>
+        <p:sp>
+          <p:nvSpPr>
+            <p:cNvPr id="13" name="下箭头 12"/>
+            <p:cNvSpPr/>
+            <p:nvPr/>
+          </p:nvSpPr>
+          <p:spPr>
+            <a:xfrm>
+              <a:off x="7380312" y="3747363"/>
+              <a:ext cx="864096" cy="1121184"/>
+            </a:xfrm>
+            <a:prstGeom prst="downArrow">
+              <a:avLst/>
+            </a:prstGeom>
+          </p:spPr>
+          <p:style>
+            <a:lnRef idx="1">
+              <a:schemeClr val="accent1"/>
+            </a:lnRef>
+            <a:fillRef idx="3">
+              <a:schemeClr val="accent1"/>
+            </a:fillRef>
+            <a:effectRef idx="2">
+              <a:schemeClr val="accent1"/>
+            </a:effectRef>
+            <a:fontRef idx="minor">
+              <a:schemeClr val="lt1"/>
+            </a:fontRef>
+          </p:style>
+          <p:txBody>
+            <a:bodyPr rtlCol="0" anchor="ctr"/>
+            <a:lstStyle/>
+            <a:p>
+              <a:pPr algn="ctr"/>
+              <a:endParaRPr lang="zh-CN" altLang="en-US"/>
+            </a:p>
+          </p:txBody>
+        </p:sp>
+        <p:sp>
+          <p:nvSpPr>
+            <p:cNvPr id="2" name="流程图: 磁盘 1"/>
+            <p:cNvSpPr/>
+            <p:nvPr/>
+          </p:nvSpPr>
+          <p:spPr>
+            <a:xfrm>
+              <a:off x="7092280" y="5013176"/>
+              <a:ext cx="1584176" cy="1080120"/>
+            </a:xfrm>
+            <a:prstGeom prst="flowChartMagneticDisk">
+              <a:avLst/>
+            </a:prstGeom>
+          </p:spPr>
+          <p:style>
+            <a:lnRef idx="1">
+              <a:schemeClr val="accent5"/>
+            </a:lnRef>
+            <a:fillRef idx="3">
+              <a:schemeClr val="accent5"/>
+            </a:fillRef>
+            <a:effectRef idx="2">
+              <a:schemeClr val="accent5"/>
+            </a:effectRef>
+            <a:fontRef idx="minor">
+              <a:schemeClr val="lt1"/>
+            </a:fontRef>
+          </p:style>
+          <p:txBody>
+            <a:bodyPr rtlCol="0" anchor="ctr"/>
+            <a:lstStyle/>
+            <a:p>
+              <a:pPr algn="ctr"/>
+              <a:r>
+                <a:rPr lang="en-US" altLang="zh-CN" dirty="0" smtClean="0"/>
+                <a:t>Expression Data</a:t>
+              </a:r>
+              <a:endParaRPr lang="zh-CN" altLang="en-US" dirty="0"/>
+            </a:p>
+          </p:txBody>
+        </p:sp>
+        <p:sp>
+          <p:nvSpPr>
+            <p:cNvPr id="3" name="TextBox 2"/>
+            <p:cNvSpPr txBox="1"/>
+            <p:nvPr/>
+          </p:nvSpPr>
+          <p:spPr>
+            <a:xfrm>
+              <a:off x="6679346" y="3938623"/>
+              <a:ext cx="825867" cy="369332"/>
+            </a:xfrm>
+            <a:prstGeom prst="rect">
+              <a:avLst/>
+            </a:prstGeom>
+            <a:noFill/>
+          </p:spPr>
+          <p:txBody>
+            <a:bodyPr wrap="none" rtlCol="0">
+              <a:spAutoFit/>
+            </a:bodyPr>
+            <a:lstStyle/>
+            <a:p>
+              <a:r>
+                <a:rPr lang="en-US" altLang="zh-CN" dirty="0" smtClean="0"/>
+                <a:t>output</a:t>
+              </a:r>
+              <a:endParaRPr lang="zh-CN" altLang="en-US" dirty="0"/>
+            </a:p>
+          </p:txBody>
+        </p:sp>
+        <p:sp>
+          <p:nvSpPr>
+            <p:cNvPr id="14" name="下箭头 13"/>
+            <p:cNvSpPr/>
+            <p:nvPr/>
+          </p:nvSpPr>
+          <p:spPr>
+            <a:xfrm rot="5400000">
+              <a:off x="5708656" y="4776620"/>
+              <a:ext cx="864096" cy="1553232"/>
+            </a:xfrm>
+            <a:prstGeom prst="downArrow">
+              <a:avLst/>
+            </a:prstGeom>
+          </p:spPr>
+          <p:style>
+            <a:lnRef idx="1">
+              <a:schemeClr val="accent1"/>
+            </a:lnRef>
+            <a:fillRef idx="3">
+              <a:schemeClr val="accent1"/>
+            </a:fillRef>
+            <a:effectRef idx="2">
+              <a:schemeClr val="accent1"/>
+            </a:effectRef>
+            <a:fontRef idx="minor">
+              <a:schemeClr val="lt1"/>
+            </a:fontRef>
+          </p:style>
+          <p:txBody>
+            <a:bodyPr rtlCol="0" anchor="ctr"/>
+            <a:lstStyle/>
+            <a:p>
+              <a:pPr algn="ctr"/>
+              <a:endParaRPr lang="zh-CN" altLang="en-US"/>
+            </a:p>
+          </p:txBody>
+        </p:sp>
+        <p:graphicFrame>
+          <p:nvGraphicFramePr>
+            <p:cNvPr id="15" name="图表 14"/>
+            <p:cNvGraphicFramePr/>
+            <p:nvPr>
+              <p:extLst>
+                <p:ext uri="{D42A27DB-BD31-4B8C-83A1-F6EECF244321}">
+                  <p14:modId xmlns:p14="http://schemas.microsoft.com/office/powerpoint/2010/main" val="1467013572"/>
+                </p:ext>
+              </p:extLst>
+            </p:nvPr>
+          </p:nvGraphicFramePr>
+          <p:xfrm>
+            <a:off x="1669806" y="4437112"/>
+            <a:ext cx="3718855" cy="2327188"/>
+          </p:xfrm>
+          <a:graphic>
+            <a:graphicData uri="http://schemas.openxmlformats.org/drawingml/2006/chart">
+              <c:chart xmlns:c="http://schemas.openxmlformats.org/drawingml/2006/chart" xmlns:r="http://schemas.openxmlformats.org/officeDocument/2006/relationships" r:id="rId7"/>
+            </a:graphicData>
+          </a:graphic>
+        </p:graphicFrame>
+        <p:sp>
+          <p:nvSpPr>
+            <p:cNvPr id="16" name="TextBox 15"/>
+            <p:cNvSpPr txBox="1"/>
+            <p:nvPr/>
+          </p:nvSpPr>
+          <p:spPr>
+            <a:xfrm>
+              <a:off x="5839570" y="5908630"/>
+              <a:ext cx="915122" cy="369332"/>
+            </a:xfrm>
+            <a:prstGeom prst="rect">
+              <a:avLst/>
+            </a:prstGeom>
+            <a:noFill/>
+          </p:spPr>
+          <p:txBody>
+            <a:bodyPr wrap="none" rtlCol="0">
+              <a:spAutoFit/>
+            </a:bodyPr>
+            <a:lstStyle/>
+            <a:p>
+              <a:r>
+                <a:rPr lang="en-US" altLang="zh-CN" dirty="0" smtClean="0"/>
+                <a:t>analysis</a:t>
+              </a:r>
+              <a:endParaRPr lang="zh-CN" altLang="en-US" dirty="0"/>
+            </a:p>
+          </p:txBody>
+        </p:sp>
+      </p:grpSp>
     </p:spTree>
     <p:extLst>
       <p:ext uri="{BB962C8B-B14F-4D97-AF65-F5344CB8AC3E}">

</xml_diff>

<commit_message>
add cellular data models
</commit_message>
<xml_diff>
--- a/src/GCModeller/engine/docs/workflow.pptx
+++ b/src/GCModeller/engine/docs/workflow.pptx
@@ -6,6 +6,7 @@
   </p:sldMasterIdLst>
   <p:sldIdLst>
     <p:sldId id="256" r:id="rId2"/>
+    <p:sldId id="257" r:id="rId3"/>
   </p:sldIdLst>
   <p:sldSz cx="9144000" cy="6858000" type="screen4x3"/>
   <p:notesSz cx="6858000" cy="9144000"/>
@@ -2441,12 +2442,12 @@
         </a:fontRef>
       </dsp:style>
       <dsp:txBody>
-        <a:bodyPr spcFirstLastPara="0" vert="horz" wrap="square" lIns="26670" tIns="26670" rIns="26670" bIns="26670" numCol="1" spcCol="1270" anchor="ctr" anchorCtr="0">
+        <a:bodyPr spcFirstLastPara="0" vert="horz" wrap="square" lIns="25400" tIns="25400" rIns="25400" bIns="25400" numCol="1" spcCol="1270" anchor="ctr" anchorCtr="0">
           <a:noAutofit/>
         </a:bodyPr>
         <a:lstStyle/>
         <a:p>
-          <a:pPr lvl="0" algn="ctr" defTabSz="933450">
+          <a:pPr lvl="0" algn="ctr" defTabSz="889000">
             <a:lnSpc>
               <a:spcPct val="90000"/>
             </a:lnSpc>
@@ -2457,7 +2458,7 @@
               <a:spcPct val="35000"/>
             </a:spcAft>
           </a:pPr>
-          <a:endParaRPr lang="zh-CN" altLang="en-US" sz="2100" kern="1200" dirty="0"/>
+          <a:endParaRPr lang="zh-CN" altLang="en-US" sz="2000" kern="1200" dirty="0"/>
         </a:p>
       </dsp:txBody>
       <dsp:txXfrm>
@@ -4537,7 +4538,7 @@
           <a:p>
             <a:fld id="{530820CF-B880-4189-942D-D702A7CBA730}" type="datetimeFigureOut">
               <a:rPr lang="zh-CN" altLang="en-US" smtClean="0"/>
-              <a:t>2018/10/3</a:t>
+              <a:t>2018/10/7</a:t>
             </a:fld>
             <a:endParaRPr lang="zh-CN" altLang="en-US"/>
           </a:p>
@@ -4702,7 +4703,7 @@
           <a:p>
             <a:fld id="{530820CF-B880-4189-942D-D702A7CBA730}" type="datetimeFigureOut">
               <a:rPr lang="zh-CN" altLang="en-US" smtClean="0"/>
-              <a:t>2018/10/3</a:t>
+              <a:t>2018/10/7</a:t>
             </a:fld>
             <a:endParaRPr lang="zh-CN" altLang="en-US"/>
           </a:p>
@@ -4877,7 +4878,7 @@
           <a:p>
             <a:fld id="{530820CF-B880-4189-942D-D702A7CBA730}" type="datetimeFigureOut">
               <a:rPr lang="zh-CN" altLang="en-US" smtClean="0"/>
-              <a:t>2018/10/3</a:t>
+              <a:t>2018/10/7</a:t>
             </a:fld>
             <a:endParaRPr lang="zh-CN" altLang="en-US"/>
           </a:p>
@@ -5042,7 +5043,7 @@
           <a:p>
             <a:fld id="{530820CF-B880-4189-942D-D702A7CBA730}" type="datetimeFigureOut">
               <a:rPr lang="zh-CN" altLang="en-US" smtClean="0"/>
-              <a:t>2018/10/3</a:t>
+              <a:t>2018/10/7</a:t>
             </a:fld>
             <a:endParaRPr lang="zh-CN" altLang="en-US"/>
           </a:p>
@@ -5283,7 +5284,7 @@
           <a:p>
             <a:fld id="{530820CF-B880-4189-942D-D702A7CBA730}" type="datetimeFigureOut">
               <a:rPr lang="zh-CN" altLang="en-US" smtClean="0"/>
-              <a:t>2018/10/3</a:t>
+              <a:t>2018/10/7</a:t>
             </a:fld>
             <a:endParaRPr lang="zh-CN" altLang="en-US"/>
           </a:p>
@@ -5566,7 +5567,7 @@
           <a:p>
             <a:fld id="{530820CF-B880-4189-942D-D702A7CBA730}" type="datetimeFigureOut">
               <a:rPr lang="zh-CN" altLang="en-US" smtClean="0"/>
-              <a:t>2018/10/3</a:t>
+              <a:t>2018/10/7</a:t>
             </a:fld>
             <a:endParaRPr lang="zh-CN" altLang="en-US"/>
           </a:p>
@@ -5983,7 +5984,7 @@
           <a:p>
             <a:fld id="{530820CF-B880-4189-942D-D702A7CBA730}" type="datetimeFigureOut">
               <a:rPr lang="zh-CN" altLang="en-US" smtClean="0"/>
-              <a:t>2018/10/3</a:t>
+              <a:t>2018/10/7</a:t>
             </a:fld>
             <a:endParaRPr lang="zh-CN" altLang="en-US"/>
           </a:p>
@@ -6096,7 +6097,7 @@
           <a:p>
             <a:fld id="{530820CF-B880-4189-942D-D702A7CBA730}" type="datetimeFigureOut">
               <a:rPr lang="zh-CN" altLang="en-US" smtClean="0"/>
-              <a:t>2018/10/3</a:t>
+              <a:t>2018/10/7</a:t>
             </a:fld>
             <a:endParaRPr lang="zh-CN" altLang="en-US"/>
           </a:p>
@@ -6186,7 +6187,7 @@
           <a:p>
             <a:fld id="{530820CF-B880-4189-942D-D702A7CBA730}" type="datetimeFigureOut">
               <a:rPr lang="zh-CN" altLang="en-US" smtClean="0"/>
-              <a:t>2018/10/3</a:t>
+              <a:t>2018/10/7</a:t>
             </a:fld>
             <a:endParaRPr lang="zh-CN" altLang="en-US"/>
           </a:p>
@@ -6458,7 +6459,7 @@
           <a:p>
             <a:fld id="{530820CF-B880-4189-942D-D702A7CBA730}" type="datetimeFigureOut">
               <a:rPr lang="zh-CN" altLang="en-US" smtClean="0"/>
-              <a:t>2018/10/3</a:t>
+              <a:t>2018/10/7</a:t>
             </a:fld>
             <a:endParaRPr lang="zh-CN" altLang="en-US"/>
           </a:p>
@@ -6706,7 +6707,7 @@
           <a:p>
             <a:fld id="{530820CF-B880-4189-942D-D702A7CBA730}" type="datetimeFigureOut">
               <a:rPr lang="zh-CN" altLang="en-US" smtClean="0"/>
-              <a:t>2018/10/3</a:t>
+              <a:t>2018/10/7</a:t>
             </a:fld>
             <a:endParaRPr lang="zh-CN" altLang="en-US"/>
           </a:p>
@@ -6914,7 +6915,7 @@
           <a:p>
             <a:fld id="{530820CF-B880-4189-942D-D702A7CBA730}" type="datetimeFigureOut">
               <a:rPr lang="zh-CN" altLang="en-US" smtClean="0"/>
-              <a:t>2018/10/3</a:t>
+              <a:t>2018/10/7</a:t>
             </a:fld>
             <a:endParaRPr lang="zh-CN" altLang="en-US"/>
           </a:p>
@@ -7846,6 +7847,36 @@
 </p:sld>
 </file>
 
+<file path=ppt/slides/slide2.xml><?xml version="1.0" encoding="utf-8"?>
+<p:sld xmlns:a="http://schemas.openxmlformats.org/drawingml/2006/main" xmlns:r="http://schemas.openxmlformats.org/officeDocument/2006/relationships" xmlns:p="http://schemas.openxmlformats.org/presentationml/2006/main">
+  <p:cSld>
+    <p:spTree>
+      <p:nvGrpSpPr>
+        <p:cNvPr id="1" name=""/>
+        <p:cNvGrpSpPr/>
+        <p:nvPr/>
+      </p:nvGrpSpPr>
+      <p:grpSpPr>
+        <a:xfrm>
+          <a:off x="0" y="0"/>
+          <a:ext cx="0" cy="0"/>
+          <a:chOff x="0" y="0"/>
+          <a:chExt cx="0" cy="0"/>
+        </a:xfrm>
+      </p:grpSpPr>
+    </p:spTree>
+    <p:extLst>
+      <p:ext uri="{BB962C8B-B14F-4D97-AF65-F5344CB8AC3E}">
+        <p14:creationId xmlns:p14="http://schemas.microsoft.com/office/powerpoint/2010/main" val="1570337402"/>
+      </p:ext>
+    </p:extLst>
+  </p:cSld>
+  <p:clrMapOvr>
+    <a:masterClrMapping/>
+  </p:clrMapOvr>
+</p:sld>
+</file>
+
 <file path=ppt/theme/theme1.xml><?xml version="1.0" encoding="utf-8"?>
 <a:theme xmlns:a="http://schemas.openxmlformats.org/drawingml/2006/main" name="Office 主题">
   <a:themeElements>

</xml_diff>

<commit_message>
using compiler to decouple foundation module with engine modules
</commit_message>
<xml_diff>
--- a/src/GCModeller/engine/docs/workflow.pptx
+++ b/src/GCModeller/engine/docs/workflow.pptx
@@ -7864,6 +7864,365 @@
           <a:chExt cx="0" cy="0"/>
         </a:xfrm>
       </p:grpSpPr>
+      <p:grpSp>
+        <p:nvGrpSpPr>
+          <p:cNvPr id="10" name="Group 9"/>
+          <p:cNvGrpSpPr/>
+          <p:nvPr/>
+        </p:nvGrpSpPr>
+        <p:grpSpPr>
+          <a:xfrm>
+            <a:off x="467544" y="764704"/>
+            <a:ext cx="7992888" cy="2736304"/>
+            <a:chOff x="467544" y="764704"/>
+            <a:chExt cx="7992888" cy="2736304"/>
+          </a:xfrm>
+        </p:grpSpPr>
+        <p:sp>
+          <p:nvSpPr>
+            <p:cNvPr id="2" name="Rectangle 1"/>
+            <p:cNvSpPr/>
+            <p:nvPr/>
+          </p:nvSpPr>
+          <p:spPr>
+            <a:xfrm>
+              <a:off x="467544" y="1628800"/>
+              <a:ext cx="1872208" cy="864096"/>
+            </a:xfrm>
+            <a:prstGeom prst="rect">
+              <a:avLst/>
+            </a:prstGeom>
+          </p:spPr>
+          <p:style>
+            <a:lnRef idx="1">
+              <a:schemeClr val="accent1"/>
+            </a:lnRef>
+            <a:fillRef idx="3">
+              <a:schemeClr val="accent1"/>
+            </a:fillRef>
+            <a:effectRef idx="2">
+              <a:schemeClr val="accent1"/>
+            </a:effectRef>
+            <a:fontRef idx="minor">
+              <a:schemeClr val="lt1"/>
+            </a:fontRef>
+          </p:style>
+          <p:txBody>
+            <a:bodyPr rtlCol="0" anchor="ctr"/>
+            <a:lstStyle/>
+            <a:p>
+              <a:pPr algn="ctr"/>
+              <a:r>
+                <a:rPr lang="en-US" dirty="0" smtClean="0"/>
+                <a:t>Compiler</a:t>
+              </a:r>
+            </a:p>
+          </p:txBody>
+        </p:sp>
+        <p:sp>
+          <p:nvSpPr>
+            <p:cNvPr id="3" name="Rectangle 2"/>
+            <p:cNvSpPr/>
+            <p:nvPr/>
+          </p:nvSpPr>
+          <p:spPr>
+            <a:xfrm>
+              <a:off x="3563888" y="1628800"/>
+              <a:ext cx="1872208" cy="864096"/>
+            </a:xfrm>
+            <a:prstGeom prst="rect">
+              <a:avLst/>
+            </a:prstGeom>
+          </p:spPr>
+          <p:style>
+            <a:lnRef idx="1">
+              <a:schemeClr val="accent1"/>
+            </a:lnRef>
+            <a:fillRef idx="3">
+              <a:schemeClr val="accent1"/>
+            </a:fillRef>
+            <a:effectRef idx="2">
+              <a:schemeClr val="accent1"/>
+            </a:effectRef>
+            <a:fontRef idx="minor">
+              <a:schemeClr val="lt1"/>
+            </a:fontRef>
+          </p:style>
+          <p:txBody>
+            <a:bodyPr rtlCol="0" anchor="ctr"/>
+            <a:lstStyle/>
+            <a:p>
+              <a:pPr algn="ctr"/>
+              <a:r>
+                <a:rPr lang="en-US" dirty="0" smtClean="0"/>
+                <a:t>Model</a:t>
+              </a:r>
+            </a:p>
+          </p:txBody>
+        </p:sp>
+        <p:sp>
+          <p:nvSpPr>
+            <p:cNvPr id="4" name="Rectangle 3"/>
+            <p:cNvSpPr/>
+            <p:nvPr/>
+          </p:nvSpPr>
+          <p:spPr>
+            <a:xfrm>
+              <a:off x="6588224" y="764704"/>
+              <a:ext cx="1872208" cy="864096"/>
+            </a:xfrm>
+            <a:prstGeom prst="rect">
+              <a:avLst/>
+            </a:prstGeom>
+          </p:spPr>
+          <p:style>
+            <a:lnRef idx="1">
+              <a:schemeClr val="accent1"/>
+            </a:lnRef>
+            <a:fillRef idx="3">
+              <a:schemeClr val="accent1"/>
+            </a:fillRef>
+            <a:effectRef idx="2">
+              <a:schemeClr val="accent1"/>
+            </a:effectRef>
+            <a:fontRef idx="minor">
+              <a:schemeClr val="lt1"/>
+            </a:fontRef>
+          </p:style>
+          <p:txBody>
+            <a:bodyPr rtlCol="0" anchor="ctr"/>
+            <a:lstStyle/>
+            <a:p>
+              <a:pPr algn="ctr"/>
+              <a:r>
+                <a:rPr lang="en-US" dirty="0" smtClean="0"/>
+                <a:t>Markup Language</a:t>
+              </a:r>
+            </a:p>
+          </p:txBody>
+        </p:sp>
+        <p:sp>
+          <p:nvSpPr>
+            <p:cNvPr id="5" name="Rectangle 4"/>
+            <p:cNvSpPr/>
+            <p:nvPr/>
+          </p:nvSpPr>
+          <p:spPr>
+            <a:xfrm>
+              <a:off x="6588224" y="2636912"/>
+              <a:ext cx="1872208" cy="864096"/>
+            </a:xfrm>
+            <a:prstGeom prst="rect">
+              <a:avLst/>
+            </a:prstGeom>
+          </p:spPr>
+          <p:style>
+            <a:lnRef idx="1">
+              <a:schemeClr val="accent1"/>
+            </a:lnRef>
+            <a:fillRef idx="3">
+              <a:schemeClr val="accent1"/>
+            </a:fillRef>
+            <a:effectRef idx="2">
+              <a:schemeClr val="accent1"/>
+            </a:effectRef>
+            <a:fontRef idx="minor">
+              <a:schemeClr val="lt1"/>
+            </a:fontRef>
+          </p:style>
+          <p:txBody>
+            <a:bodyPr rtlCol="0" anchor="ctr"/>
+            <a:lstStyle/>
+            <a:p>
+              <a:pPr algn="ctr"/>
+              <a:r>
+                <a:rPr lang="en-US" dirty="0" smtClean="0"/>
+                <a:t>Tabular</a:t>
+              </a:r>
+            </a:p>
+          </p:txBody>
+        </p:sp>
+        <p:sp>
+          <p:nvSpPr>
+            <p:cNvPr id="6" name="Right Arrow 5"/>
+            <p:cNvSpPr/>
+            <p:nvPr/>
+          </p:nvSpPr>
+          <p:spPr>
+            <a:xfrm>
+              <a:off x="2498620" y="1700808"/>
+              <a:ext cx="978408" cy="602356"/>
+            </a:xfrm>
+            <a:prstGeom prst="rightArrow">
+              <a:avLst/>
+            </a:prstGeom>
+          </p:spPr>
+          <p:style>
+            <a:lnRef idx="1">
+              <a:schemeClr val="accent3"/>
+            </a:lnRef>
+            <a:fillRef idx="3">
+              <a:schemeClr val="accent3"/>
+            </a:fillRef>
+            <a:effectRef idx="2">
+              <a:schemeClr val="accent3"/>
+            </a:effectRef>
+            <a:fontRef idx="minor">
+              <a:schemeClr val="lt1"/>
+            </a:fontRef>
+          </p:style>
+          <p:txBody>
+            <a:bodyPr rtlCol="0" anchor="ctr"/>
+            <a:lstStyle/>
+            <a:p>
+              <a:pPr algn="ctr"/>
+              <a:endParaRPr lang="en-US"/>
+            </a:p>
+          </p:txBody>
+        </p:sp>
+        <p:sp>
+          <p:nvSpPr>
+            <p:cNvPr id="7" name="Right Arrow 6"/>
+            <p:cNvSpPr/>
+            <p:nvPr/>
+          </p:nvSpPr>
+          <p:spPr>
+            <a:xfrm rot="19889276">
+              <a:off x="5607388" y="1261502"/>
+              <a:ext cx="978408" cy="602356"/>
+            </a:xfrm>
+            <a:prstGeom prst="rightArrow">
+              <a:avLst/>
+            </a:prstGeom>
+          </p:spPr>
+          <p:style>
+            <a:lnRef idx="1">
+              <a:schemeClr val="accent3"/>
+            </a:lnRef>
+            <a:fillRef idx="3">
+              <a:schemeClr val="accent3"/>
+            </a:fillRef>
+            <a:effectRef idx="2">
+              <a:schemeClr val="accent3"/>
+            </a:effectRef>
+            <a:fontRef idx="minor">
+              <a:schemeClr val="lt1"/>
+            </a:fontRef>
+          </p:style>
+          <p:txBody>
+            <a:bodyPr rtlCol="0" anchor="ctr"/>
+            <a:lstStyle/>
+            <a:p>
+              <a:pPr algn="ctr"/>
+              <a:endParaRPr lang="en-US"/>
+            </a:p>
+          </p:txBody>
+        </p:sp>
+        <p:sp>
+          <p:nvSpPr>
+            <p:cNvPr id="8" name="Right Arrow 7"/>
+            <p:cNvSpPr/>
+            <p:nvPr/>
+          </p:nvSpPr>
+          <p:spPr>
+            <a:xfrm rot="2106395">
+              <a:off x="5607166" y="2335734"/>
+              <a:ext cx="978408" cy="602356"/>
+            </a:xfrm>
+            <a:prstGeom prst="rightArrow">
+              <a:avLst/>
+            </a:prstGeom>
+          </p:spPr>
+          <p:style>
+            <a:lnRef idx="1">
+              <a:schemeClr val="accent3"/>
+            </a:lnRef>
+            <a:fillRef idx="3">
+              <a:schemeClr val="accent3"/>
+            </a:fillRef>
+            <a:effectRef idx="2">
+              <a:schemeClr val="accent3"/>
+            </a:effectRef>
+            <a:fontRef idx="minor">
+              <a:schemeClr val="lt1"/>
+            </a:fontRef>
+          </p:style>
+          <p:txBody>
+            <a:bodyPr rtlCol="0" anchor="ctr"/>
+            <a:lstStyle/>
+            <a:p>
+              <a:pPr algn="ctr"/>
+              <a:endParaRPr lang="en-US"/>
+            </a:p>
+          </p:txBody>
+        </p:sp>
+        <p:sp>
+          <p:nvSpPr>
+            <p:cNvPr id="9" name="Rounded Rectangular Callout 8"/>
+            <p:cNvSpPr/>
+            <p:nvPr/>
+          </p:nvSpPr>
+          <p:spPr>
+            <a:xfrm>
+              <a:off x="1547664" y="2625213"/>
+              <a:ext cx="2473424" cy="875795"/>
+            </a:xfrm>
+            <a:prstGeom prst="wedgeRoundRectCallout">
+              <a:avLst>
+                <a:gd name="adj1" fmla="val 8929"/>
+                <a:gd name="adj2" fmla="val -85992"/>
+                <a:gd name="adj3" fmla="val 16667"/>
+              </a:avLst>
+            </a:prstGeom>
+          </p:spPr>
+          <p:style>
+            <a:lnRef idx="1">
+              <a:schemeClr val="accent2"/>
+            </a:lnRef>
+            <a:fillRef idx="3">
+              <a:schemeClr val="accent2"/>
+            </a:fillRef>
+            <a:effectRef idx="2">
+              <a:schemeClr val="accent2"/>
+            </a:effectRef>
+            <a:fontRef idx="minor">
+              <a:schemeClr val="lt1"/>
+            </a:fontRef>
+          </p:style>
+          <p:txBody>
+            <a:bodyPr rtlCol="0" anchor="ctr"/>
+            <a:lstStyle/>
+            <a:p>
+              <a:pPr algn="ctr"/>
+              <a:r>
+                <a:rPr lang="zh-CN" altLang="en-US" sz="1600" dirty="0" smtClean="0">
+                  <a:latin typeface="微软雅黑" panose="020B0503020204020204" pitchFamily="34" charset="-122"/>
+                  <a:ea typeface="微软雅黑" panose="020B0503020204020204" pitchFamily="34" charset="-122"/>
+                </a:rPr>
+                <a:t>在这里将引擎模块与</a:t>
+              </a:r>
+              <a:r>
+                <a:rPr lang="en-US" altLang="zh-CN" sz="1600" dirty="0" smtClean="0">
+                  <a:latin typeface="微软雅黑" panose="020B0503020204020204" pitchFamily="34" charset="-122"/>
+                  <a:ea typeface="微软雅黑" panose="020B0503020204020204" pitchFamily="34" charset="-122"/>
+                </a:rPr>
+                <a:t>GCModeller</a:t>
+              </a:r>
+              <a:r>
+                <a:rPr lang="zh-CN" altLang="en-US" sz="1600" dirty="0" smtClean="0">
+                  <a:latin typeface="微软雅黑" panose="020B0503020204020204" pitchFamily="34" charset="-122"/>
+                  <a:ea typeface="微软雅黑" panose="020B0503020204020204" pitchFamily="34" charset="-122"/>
+                </a:rPr>
+                <a:t>的其他基础模块进行解耦和</a:t>
+              </a:r>
+              <a:endParaRPr lang="en-US" sz="1600" dirty="0">
+                <a:latin typeface="微软雅黑" panose="020B0503020204020204" pitchFamily="34" charset="-122"/>
+                <a:ea typeface="微软雅黑" panose="020B0503020204020204" pitchFamily="34" charset="-122"/>
+              </a:endParaRPr>
+            </a:p>
+          </p:txBody>
+        </p:sp>
+      </p:grpSp>
     </p:spTree>
     <p:extLst>
       <p:ext uri="{BB962C8B-B14F-4D97-AF65-F5344CB8AC3E}">

</xml_diff>